<commit_message>
add icon power point
</commit_message>
<xml_diff>
--- a/git-icon.pptx
+++ b/git-icon.pptx
@@ -14,6 +14,8 @@
     <p:sldId id="262" r:id="rId8"/>
     <p:sldId id="263" r:id="rId9"/>
     <p:sldId id="264" r:id="rId10"/>
+    <p:sldId id="265" r:id="rId11"/>
+    <p:sldId id="266" r:id="rId12"/>
   </p:sldIdLst>
   <p:sldSz cx="12192000" cy="6858000"/>
   <p:notesSz cx="6858000" cy="9144000"/>
@@ -267,7 +269,7 @@
           <a:p>
             <a:fld id="{ABC1243C-BB82-4738-8C2C-6945F601F552}" type="datetimeFigureOut">
               <a:rPr kumimoji="1" lang="ja-JP" altLang="en-US" smtClean="0"/>
-              <a:t>2019/7/6</a:t>
+              <a:t>2021/7/16</a:t>
             </a:fld>
             <a:endParaRPr kumimoji="1" lang="ja-JP" altLang="en-US"/>
           </a:p>
@@ -497,7 +499,7 @@
           <a:p>
             <a:fld id="{ABC1243C-BB82-4738-8C2C-6945F601F552}" type="datetimeFigureOut">
               <a:rPr kumimoji="1" lang="ja-JP" altLang="en-US" smtClean="0"/>
-              <a:t>2019/7/6</a:t>
+              <a:t>2021/7/16</a:t>
             </a:fld>
             <a:endParaRPr kumimoji="1" lang="ja-JP" altLang="en-US"/>
           </a:p>
@@ -737,7 +739,7 @@
           <a:p>
             <a:fld id="{ABC1243C-BB82-4738-8C2C-6945F601F552}" type="datetimeFigureOut">
               <a:rPr kumimoji="1" lang="ja-JP" altLang="en-US" smtClean="0"/>
-              <a:t>2019/7/6</a:t>
+              <a:t>2021/7/16</a:t>
             </a:fld>
             <a:endParaRPr kumimoji="1" lang="ja-JP" altLang="en-US"/>
           </a:p>
@@ -967,7 +969,7 @@
           <a:p>
             <a:fld id="{ABC1243C-BB82-4738-8C2C-6945F601F552}" type="datetimeFigureOut">
               <a:rPr kumimoji="1" lang="ja-JP" altLang="en-US" smtClean="0"/>
-              <a:t>2019/7/6</a:t>
+              <a:t>2021/7/16</a:t>
             </a:fld>
             <a:endParaRPr kumimoji="1" lang="ja-JP" altLang="en-US"/>
           </a:p>
@@ -1242,7 +1244,7 @@
           <a:p>
             <a:fld id="{ABC1243C-BB82-4738-8C2C-6945F601F552}" type="datetimeFigureOut">
               <a:rPr kumimoji="1" lang="ja-JP" altLang="en-US" smtClean="0"/>
-              <a:t>2019/7/6</a:t>
+              <a:t>2021/7/16</a:t>
             </a:fld>
             <a:endParaRPr kumimoji="1" lang="ja-JP" altLang="en-US"/>
           </a:p>
@@ -1571,7 +1573,7 @@
           <a:p>
             <a:fld id="{ABC1243C-BB82-4738-8C2C-6945F601F552}" type="datetimeFigureOut">
               <a:rPr kumimoji="1" lang="ja-JP" altLang="en-US" smtClean="0"/>
-              <a:t>2019/7/6</a:t>
+              <a:t>2021/7/16</a:t>
             </a:fld>
             <a:endParaRPr kumimoji="1" lang="ja-JP" altLang="en-US"/>
           </a:p>
@@ -2047,7 +2049,7 @@
           <a:p>
             <a:fld id="{ABC1243C-BB82-4738-8C2C-6945F601F552}" type="datetimeFigureOut">
               <a:rPr kumimoji="1" lang="ja-JP" altLang="en-US" smtClean="0"/>
-              <a:t>2019/7/6</a:t>
+              <a:t>2021/7/16</a:t>
             </a:fld>
             <a:endParaRPr kumimoji="1" lang="ja-JP" altLang="en-US"/>
           </a:p>
@@ -2188,7 +2190,7 @@
           <a:p>
             <a:fld id="{ABC1243C-BB82-4738-8C2C-6945F601F552}" type="datetimeFigureOut">
               <a:rPr kumimoji="1" lang="ja-JP" altLang="en-US" smtClean="0"/>
-              <a:t>2019/7/6</a:t>
+              <a:t>2021/7/16</a:t>
             </a:fld>
             <a:endParaRPr kumimoji="1" lang="ja-JP" altLang="en-US"/>
           </a:p>
@@ -2301,7 +2303,7 @@
           <a:p>
             <a:fld id="{ABC1243C-BB82-4738-8C2C-6945F601F552}" type="datetimeFigureOut">
               <a:rPr kumimoji="1" lang="ja-JP" altLang="en-US" smtClean="0"/>
-              <a:t>2019/7/6</a:t>
+              <a:t>2021/7/16</a:t>
             </a:fld>
             <a:endParaRPr kumimoji="1" lang="ja-JP" altLang="en-US"/>
           </a:p>
@@ -2644,7 +2646,7 @@
           <a:p>
             <a:fld id="{ABC1243C-BB82-4738-8C2C-6945F601F552}" type="datetimeFigureOut">
               <a:rPr kumimoji="1" lang="ja-JP" altLang="en-US" smtClean="0"/>
-              <a:t>2019/7/6</a:t>
+              <a:t>2021/7/16</a:t>
             </a:fld>
             <a:endParaRPr kumimoji="1" lang="ja-JP" altLang="en-US"/>
           </a:p>
@@ -2932,7 +2934,7 @@
           <a:p>
             <a:fld id="{ABC1243C-BB82-4738-8C2C-6945F601F552}" type="datetimeFigureOut">
               <a:rPr kumimoji="1" lang="ja-JP" altLang="en-US" smtClean="0"/>
-              <a:t>2019/7/6</a:t>
+              <a:t>2021/7/16</a:t>
             </a:fld>
             <a:endParaRPr kumimoji="1" lang="ja-JP" altLang="en-US"/>
           </a:p>
@@ -3205,7 +3207,7 @@
           <a:p>
             <a:fld id="{ABC1243C-BB82-4738-8C2C-6945F601F552}" type="datetimeFigureOut">
               <a:rPr kumimoji="1" lang="ja-JP" altLang="en-US" smtClean="0"/>
-              <a:t>2019/7/6</a:t>
+              <a:t>2021/7/16</a:t>
             </a:fld>
             <a:endParaRPr kumimoji="1" lang="ja-JP" altLang="en-US"/>
           </a:p>
@@ -4304,6 +4306,1697 @@
     <p:extLst>
       <p:ext uri="{BB962C8B-B14F-4D97-AF65-F5344CB8AC3E}">
         <p14:creationId xmlns:p14="http://schemas.microsoft.com/office/powerpoint/2010/main" val="672663749"/>
+      </p:ext>
+    </p:extLst>
+  </p:cSld>
+  <p:clrMapOvr>
+    <a:masterClrMapping/>
+  </p:clrMapOvr>
+</p:sld>
+</file>
+
+<file path=ppt/slides/slide10.xml><?xml version="1.0" encoding="utf-8"?>
+<p:sld xmlns:a="http://schemas.openxmlformats.org/drawingml/2006/main" xmlns:r="http://schemas.openxmlformats.org/officeDocument/2006/relationships" xmlns:p="http://schemas.openxmlformats.org/presentationml/2006/main">
+  <p:cSld>
+    <p:bg>
+      <p:bgPr>
+        <a:solidFill>
+          <a:schemeClr val="bg1"/>
+        </a:solidFill>
+        <a:effectLst/>
+      </p:bgPr>
+    </p:bg>
+    <p:spTree>
+      <p:nvGrpSpPr>
+        <p:cNvPr id="1" name=""/>
+        <p:cNvGrpSpPr/>
+        <p:nvPr/>
+      </p:nvGrpSpPr>
+      <p:grpSpPr>
+        <a:xfrm>
+          <a:off x="0" y="0"/>
+          <a:ext cx="0" cy="0"/>
+          <a:chOff x="0" y="0"/>
+          <a:chExt cx="0" cy="0"/>
+        </a:xfrm>
+      </p:grpSpPr>
+      <p:sp useBgFill="1">
+        <p:nvSpPr>
+          <p:cNvPr id="8" name="Rectangle 7">
+            <a:extLst>
+              <a:ext uri="{FF2B5EF4-FFF2-40B4-BE49-F238E27FC236}">
+                <a16:creationId xmlns:a16="http://schemas.microsoft.com/office/drawing/2014/main" id="{7BDAC5B6-20CE-447F-8BA1-F2274AC7AE5B}"/>
+              </a:ext>
+              <a:ext uri="{C183D7F6-B498-43B3-948B-1728B52AA6E4}">
+                <adec:decorative xmlns:adec="http://schemas.microsoft.com/office/drawing/2017/decorative" val="1"/>
+              </a:ext>
+            </a:extLst>
+          </p:cNvPr>
+          <p:cNvSpPr>
+            <a:spLocks noGrp="1" noRot="1" noChangeAspect="1" noMove="1" noResize="1" noEditPoints="1" noAdjustHandles="1" noChangeArrowheads="1" noChangeShapeType="1" noTextEdit="1"/>
+          </p:cNvSpPr>
+          <p:nvPr>
+            <p:extLst>
+              <p:ext uri="{386F3935-93C4-4BCD-93E2-E3B085C9AB24}">
+                <p16:designElem xmlns:p16="http://schemas.microsoft.com/office/powerpoint/2015/main" val="1"/>
+              </p:ext>
+            </p:extLst>
+          </p:nvPr>
+        </p:nvSpPr>
+        <p:spPr>
+          <a:xfrm>
+            <a:off x="0" y="0"/>
+            <a:ext cx="12192000" cy="6858000"/>
+          </a:xfrm>
+          <a:prstGeom prst="rect">
+            <a:avLst/>
+          </a:prstGeom>
+          <a:ln>
+            <a:noFill/>
+          </a:ln>
+        </p:spPr>
+        <p:style>
+          <a:lnRef idx="2">
+            <a:schemeClr val="accent1">
+              <a:shade val="50000"/>
+            </a:schemeClr>
+          </a:lnRef>
+          <a:fillRef idx="1">
+            <a:schemeClr val="accent1"/>
+          </a:fillRef>
+          <a:effectRef idx="0">
+            <a:schemeClr val="accent1"/>
+          </a:effectRef>
+          <a:fontRef idx="minor">
+            <a:schemeClr val="lt1"/>
+          </a:fontRef>
+        </p:style>
+        <p:txBody>
+          <a:bodyPr rtlCol="0" anchor="ctr"/>
+          <a:lstStyle/>
+          <a:p>
+            <a:pPr algn="ctr"/>
+            <a:endParaRPr lang="en-US"/>
+          </a:p>
+        </p:txBody>
+      </p:sp>
+      <p:sp>
+        <p:nvSpPr>
+          <p:cNvPr id="10" name="Freeform: Shape 9">
+            <a:extLst>
+              <a:ext uri="{FF2B5EF4-FFF2-40B4-BE49-F238E27FC236}">
+                <a16:creationId xmlns:a16="http://schemas.microsoft.com/office/drawing/2014/main" id="{D1D22B31-BF8F-446B-9009-8A251FB177CB}"/>
+              </a:ext>
+              <a:ext uri="{C183D7F6-B498-43B3-948B-1728B52AA6E4}">
+                <adec:decorative xmlns:adec="http://schemas.microsoft.com/office/drawing/2017/decorative" val="1"/>
+              </a:ext>
+            </a:extLst>
+          </p:cNvPr>
+          <p:cNvSpPr>
+            <a:spLocks noGrp="1" noRot="1" noChangeAspect="1" noMove="1" noResize="1" noEditPoints="1" noAdjustHandles="1" noChangeArrowheads="1" noChangeShapeType="1" noTextEdit="1"/>
+          </p:cNvSpPr>
+          <p:nvPr>
+            <p:extLst>
+              <p:ext uri="{386F3935-93C4-4BCD-93E2-E3B085C9AB24}">
+                <p16:designElem xmlns:p16="http://schemas.microsoft.com/office/powerpoint/2015/main" val="1"/>
+              </p:ext>
+            </p:extLst>
+          </p:nvPr>
+        </p:nvSpPr>
+        <p:spPr>
+          <a:xfrm>
+            <a:off x="0" y="0"/>
+            <a:ext cx="12192000" cy="6858000"/>
+          </a:xfrm>
+          <a:custGeom>
+            <a:avLst/>
+            <a:gdLst>
+              <a:gd name="connsiteX0" fmla="*/ 3094406 w 12192000"/>
+              <a:gd name="connsiteY0" fmla="*/ 283966 h 6858000"/>
+              <a:gd name="connsiteX1" fmla="*/ 3038833 w 12192000"/>
+              <a:gd name="connsiteY1" fmla="*/ 309661 h 6858000"/>
+              <a:gd name="connsiteX2" fmla="*/ 3348384 w 12192000"/>
+              <a:gd name="connsiteY2" fmla="*/ 406000 h 6858000"/>
+              <a:gd name="connsiteX3" fmla="*/ 2864309 w 12192000"/>
+              <a:gd name="connsiteY3" fmla="*/ 355295 h 6858000"/>
+              <a:gd name="connsiteX4" fmla="*/ 2856039 w 12192000"/>
+              <a:gd name="connsiteY4" fmla="*/ 388058 h 6858000"/>
+              <a:gd name="connsiteX5" fmla="*/ 3405794 w 12192000"/>
+              <a:gd name="connsiteY5" fmla="*/ 512089 h 6858000"/>
+              <a:gd name="connsiteX6" fmla="*/ 3356651 w 12192000"/>
+              <a:gd name="connsiteY6" fmla="*/ 531204 h 6858000"/>
+              <a:gd name="connsiteX7" fmla="*/ 3064552 w 12192000"/>
+              <a:gd name="connsiteY7" fmla="*/ 483228 h 6858000"/>
+              <a:gd name="connsiteX8" fmla="*/ 3005765 w 12192000"/>
+              <a:gd name="connsiteY8" fmla="*/ 495708 h 6858000"/>
+              <a:gd name="connsiteX9" fmla="*/ 3034700 w 12192000"/>
+              <a:gd name="connsiteY9" fmla="*/ 553823 h 6858000"/>
+              <a:gd name="connsiteX10" fmla="*/ 3161459 w 12192000"/>
+              <a:gd name="connsiteY10" fmla="*/ 576445 h 6858000"/>
+              <a:gd name="connsiteX11" fmla="*/ 3358949 w 12192000"/>
+              <a:gd name="connsiteY11" fmla="*/ 712961 h 6858000"/>
+              <a:gd name="connsiteX12" fmla="*/ 3059960 w 12192000"/>
+              <a:gd name="connsiteY12" fmla="*/ 696576 h 6858000"/>
+              <a:gd name="connsiteX13" fmla="*/ 3007143 w 12192000"/>
+              <a:gd name="connsiteY13" fmla="*/ 729732 h 6858000"/>
+              <a:gd name="connsiteX14" fmla="*/ 2986935 w 12192000"/>
+              <a:gd name="connsiteY14" fmla="*/ 772635 h 6858000"/>
+              <a:gd name="connsiteX15" fmla="*/ 2871197 w 12192000"/>
+              <a:gd name="connsiteY15" fmla="*/ 808127 h 6858000"/>
+              <a:gd name="connsiteX16" fmla="*/ 3053071 w 12192000"/>
+              <a:gd name="connsiteY16" fmla="*/ 847913 h 6858000"/>
+              <a:gd name="connsiteX17" fmla="*/ 2858796 w 12192000"/>
+              <a:gd name="connsiteY17" fmla="*/ 847913 h 6858000"/>
+              <a:gd name="connsiteX18" fmla="*/ 2635588 w 12192000"/>
+              <a:gd name="connsiteY18" fmla="*/ 820611 h 6858000"/>
+              <a:gd name="connsiteX19" fmla="*/ 2397683 w 12192000"/>
+              <a:gd name="connsiteY19" fmla="*/ 829190 h 6858000"/>
+              <a:gd name="connsiteX20" fmla="*/ 1921874 w 12192000"/>
+              <a:gd name="connsiteY20" fmla="*/ 778877 h 6858000"/>
+              <a:gd name="connsiteX21" fmla="*/ 1695450 w 12192000"/>
+              <a:gd name="connsiteY21" fmla="*/ 782386 h 6858000"/>
+              <a:gd name="connsiteX22" fmla="*/ 2954324 w 12192000"/>
+              <a:gd name="connsiteY22" fmla="*/ 1120940 h 6858000"/>
+              <a:gd name="connsiteX23" fmla="*/ 2890028 w 12192000"/>
+              <a:gd name="connsiteY23" fmla="*/ 1195435 h 6858000"/>
+              <a:gd name="connsiteX24" fmla="*/ 3153652 w 12192000"/>
+              <a:gd name="connsiteY24" fmla="*/ 1276563 h 6858000"/>
+              <a:gd name="connsiteX25" fmla="*/ 3218410 w 12192000"/>
+              <a:gd name="connsiteY25" fmla="*/ 1356911 h 6858000"/>
+              <a:gd name="connsiteX26" fmla="*/ 3137118 w 12192000"/>
+              <a:gd name="connsiteY26" fmla="*/ 1349891 h 6858000"/>
+              <a:gd name="connsiteX27" fmla="*/ 3067309 w 12192000"/>
+              <a:gd name="connsiteY27" fmla="*/ 1365102 h 6858000"/>
+              <a:gd name="connsiteX28" fmla="*/ 3096243 w 12192000"/>
+              <a:gd name="connsiteY28" fmla="*/ 1467292 h 6858000"/>
+              <a:gd name="connsiteX29" fmla="*/ 3468716 w 12192000"/>
+              <a:gd name="connsiteY29" fmla="*/ 1599125 h 6858000"/>
+              <a:gd name="connsiteX30" fmla="*/ 3502241 w 12192000"/>
+              <a:gd name="connsiteY30" fmla="*/ 1642029 h 6858000"/>
+              <a:gd name="connsiteX31" fmla="*/ 3457692 w 12192000"/>
+              <a:gd name="connsiteY31" fmla="*/ 1672453 h 6858000"/>
+              <a:gd name="connsiteX32" fmla="*/ 3337362 w 12192000"/>
+              <a:gd name="connsiteY32" fmla="*/ 1688053 h 6858000"/>
+              <a:gd name="connsiteX33" fmla="*/ 3505915 w 12192000"/>
+              <a:gd name="connsiteY33" fmla="*/ 1834318 h 6858000"/>
+              <a:gd name="connsiteX34" fmla="*/ 3567458 w 12192000"/>
+              <a:gd name="connsiteY34" fmla="*/ 1874880 h 6858000"/>
+              <a:gd name="connsiteX35" fmla="*/ 3672634 w 12192000"/>
+              <a:gd name="connsiteY35" fmla="*/ 1937678 h 6858000"/>
+              <a:gd name="connsiteX36" fmla="*/ 3674470 w 12192000"/>
+              <a:gd name="connsiteY36" fmla="*/ 1956789 h 6858000"/>
+              <a:gd name="connsiteX37" fmla="*/ 3531176 w 12192000"/>
+              <a:gd name="connsiteY37" fmla="*/ 2024266 h 6858000"/>
+              <a:gd name="connsiteX38" fmla="*/ 3272604 w 12192000"/>
+              <a:gd name="connsiteY38" fmla="*/ 2005933 h 6858000"/>
+              <a:gd name="connsiteX39" fmla="*/ 3654720 w 12192000"/>
+              <a:gd name="connsiteY39" fmla="*/ 2106564 h 6858000"/>
+              <a:gd name="connsiteX40" fmla="*/ 2417892 w 12192000"/>
+              <a:gd name="connsiteY40" fmla="*/ 1866690 h 6858000"/>
+              <a:gd name="connsiteX41" fmla="*/ 2496888 w 12192000"/>
+              <a:gd name="connsiteY41" fmla="*/ 1929487 h 6858000"/>
+              <a:gd name="connsiteX42" fmla="*/ 2929526 w 12192000"/>
+              <a:gd name="connsiteY42" fmla="*/ 2094862 h 6858000"/>
+              <a:gd name="connsiteX43" fmla="*/ 3052152 w 12192000"/>
+              <a:gd name="connsiteY43" fmla="*/ 2198613 h 6858000"/>
+              <a:gd name="connsiteX44" fmla="*/ 3180748 w 12192000"/>
+              <a:gd name="connsiteY44" fmla="*/ 2255948 h 6858000"/>
+              <a:gd name="connsiteX45" fmla="*/ 3361244 w 12192000"/>
+              <a:gd name="connsiteY45" fmla="*/ 2254777 h 6858000"/>
+              <a:gd name="connsiteX46" fmla="*/ 3489382 w 12192000"/>
+              <a:gd name="connsiteY46" fmla="*/ 2342926 h 6858000"/>
+              <a:gd name="connsiteX47" fmla="*/ 3355733 w 12192000"/>
+              <a:gd name="connsiteY47" fmla="*/ 2361649 h 6858000"/>
+              <a:gd name="connsiteX48" fmla="*/ 3199121 w 12192000"/>
+              <a:gd name="connsiteY48" fmla="*/ 2347216 h 6858000"/>
+              <a:gd name="connsiteX49" fmla="*/ 2861091 w 12192000"/>
+              <a:gd name="connsiteY49" fmla="*/ 2351896 h 6858000"/>
+              <a:gd name="connsiteX50" fmla="*/ 2667278 w 12192000"/>
+              <a:gd name="connsiteY50" fmla="*/ 2369058 h 6858000"/>
+              <a:gd name="connsiteX51" fmla="*/ 2221781 w 12192000"/>
+              <a:gd name="connsiteY51" fmla="*/ 2339805 h 6858000"/>
+              <a:gd name="connsiteX52" fmla="*/ 2247961 w 12192000"/>
+              <a:gd name="connsiteY52" fmla="*/ 2414693 h 6858000"/>
+              <a:gd name="connsiteX53" fmla="*/ 2231425 w 12192000"/>
+              <a:gd name="connsiteY53" fmla="*/ 2479828 h 6858000"/>
+              <a:gd name="connsiteX54" fmla="*/ 2224996 w 12192000"/>
+              <a:gd name="connsiteY54" fmla="*/ 2621414 h 6858000"/>
+              <a:gd name="connsiteX55" fmla="*/ 2229131 w 12192000"/>
+              <a:gd name="connsiteY55" fmla="*/ 2644426 h 6858000"/>
+              <a:gd name="connsiteX56" fmla="*/ 2129466 w 12192000"/>
+              <a:gd name="connsiteY56" fmla="*/ 2659247 h 6858000"/>
+              <a:gd name="connsiteX57" fmla="*/ 2723312 w 12192000"/>
+              <a:gd name="connsiteY57" fmla="*/ 2953726 h 6858000"/>
+              <a:gd name="connsiteX58" fmla="*/ 2326496 w 12192000"/>
+              <a:gd name="connsiteY58" fmla="*/ 2878838 h 6858000"/>
+              <a:gd name="connsiteX59" fmla="*/ 2272759 w 12192000"/>
+              <a:gd name="connsiteY59" fmla="*/ 3002480 h 6858000"/>
+              <a:gd name="connsiteX60" fmla="*/ 2459226 w 12192000"/>
+              <a:gd name="connsiteY60" fmla="*/ 3112471 h 6858000"/>
+              <a:gd name="connsiteX61" fmla="*/ 2528117 w 12192000"/>
+              <a:gd name="connsiteY61" fmla="*/ 3330111 h 6858000"/>
+              <a:gd name="connsiteX62" fmla="*/ 2494590 w 12192000"/>
+              <a:gd name="connsiteY62" fmla="*/ 3529029 h 6858000"/>
+              <a:gd name="connsiteX63" fmla="*/ 2414677 w 12192000"/>
+              <a:gd name="connsiteY63" fmla="*/ 3592215 h 6858000"/>
+              <a:gd name="connsiteX64" fmla="*/ 2298940 w 12192000"/>
+              <a:gd name="connsiteY64" fmla="*/ 3705716 h 6858000"/>
+              <a:gd name="connsiteX65" fmla="*/ 2227294 w 12192000"/>
+              <a:gd name="connsiteY65" fmla="*/ 3775921 h 6858000"/>
+              <a:gd name="connsiteX66" fmla="*/ 1978366 w 12192000"/>
+              <a:gd name="connsiteY66" fmla="*/ 3748620 h 6858000"/>
+              <a:gd name="connsiteX67" fmla="*/ 2310421 w 12192000"/>
+              <a:gd name="connsiteY67" fmla="*/ 3926868 h 6858000"/>
+              <a:gd name="connsiteX68" fmla="*/ 2041285 w 12192000"/>
+              <a:gd name="connsiteY68" fmla="*/ 3904635 h 6858000"/>
+              <a:gd name="connsiteX69" fmla="*/ 1953565 w 12192000"/>
+              <a:gd name="connsiteY69" fmla="*/ 3917116 h 6858000"/>
+              <a:gd name="connsiteX70" fmla="*/ 2003623 w 12192000"/>
+              <a:gd name="connsiteY70" fmla="*/ 3974842 h 6858000"/>
+              <a:gd name="connsiteX71" fmla="*/ 2201114 w 12192000"/>
+              <a:gd name="connsiteY71" fmla="*/ 4072742 h 6858000"/>
+              <a:gd name="connsiteX72" fmla="*/ 2608032 w 12192000"/>
+              <a:gd name="connsiteY72" fmla="*/ 4337967 h 6858000"/>
+              <a:gd name="connsiteX73" fmla="*/ 2213973 w 12192000"/>
+              <a:gd name="connsiteY73" fmla="*/ 4216277 h 6858000"/>
+              <a:gd name="connsiteX74" fmla="*/ 2629158 w 12192000"/>
+              <a:gd name="connsiteY74" fmla="*/ 4488911 h 6858000"/>
+              <a:gd name="connsiteX75" fmla="*/ 2721471 w 12192000"/>
+              <a:gd name="connsiteY75" fmla="*/ 4579399 h 6858000"/>
+              <a:gd name="connsiteX76" fmla="*/ 2907939 w 12192000"/>
+              <a:gd name="connsiteY76" fmla="*/ 4804062 h 6858000"/>
+              <a:gd name="connsiteX77" fmla="*/ 2898753 w 12192000"/>
+              <a:gd name="connsiteY77" fmla="*/ 4829414 h 6858000"/>
+              <a:gd name="connsiteX78" fmla="*/ 2683352 w 12192000"/>
+              <a:gd name="connsiteY78" fmla="*/ 4793141 h 6858000"/>
+              <a:gd name="connsiteX79" fmla="*/ 2962594 w 12192000"/>
+              <a:gd name="connsiteY79" fmla="*/ 4981920 h 6858000"/>
+              <a:gd name="connsiteX80" fmla="*/ 3251019 w 12192000"/>
+              <a:gd name="connsiteY80" fmla="*/ 5127012 h 6858000"/>
+              <a:gd name="connsiteX81" fmla="*/ 3046180 w 12192000"/>
+              <a:gd name="connsiteY81" fmla="*/ 5104781 h 6858000"/>
+              <a:gd name="connsiteX82" fmla="*/ 2764646 w 12192000"/>
+              <a:gd name="connsiteY82" fmla="*/ 5021703 h 6858000"/>
+              <a:gd name="connsiteX83" fmla="*/ 2666820 w 12192000"/>
+              <a:gd name="connsiteY83" fmla="*/ 5052905 h 6858000"/>
+              <a:gd name="connsiteX84" fmla="*/ 2933657 w 12192000"/>
+              <a:gd name="connsiteY84" fmla="*/ 5190198 h 6858000"/>
+              <a:gd name="connsiteX85" fmla="*/ 3086598 w 12192000"/>
+              <a:gd name="connsiteY85" fmla="*/ 5253776 h 6858000"/>
+              <a:gd name="connsiteX86" fmla="*/ 3147680 w 12192000"/>
+              <a:gd name="connsiteY86" fmla="*/ 5302531 h 6858000"/>
+              <a:gd name="connsiteX87" fmla="*/ 3322204 w 12192000"/>
+              <a:gd name="connsiteY87" fmla="*/ 5476487 h 6858000"/>
+              <a:gd name="connsiteX88" fmla="*/ 3834758 w 12192000"/>
+              <a:gd name="connsiteY88" fmla="*/ 5666434 h 6858000"/>
+              <a:gd name="connsiteX89" fmla="*/ 4314240 w 12192000"/>
+              <a:gd name="connsiteY89" fmla="*/ 5902409 h 6858000"/>
+              <a:gd name="connsiteX90" fmla="*/ 4688552 w 12192000"/>
+              <a:gd name="connsiteY90" fmla="*/ 6049453 h 6858000"/>
+              <a:gd name="connsiteX91" fmla="*/ 5634660 w 12192000"/>
+              <a:gd name="connsiteY91" fmla="*/ 6238620 h 6858000"/>
+              <a:gd name="connsiteX92" fmla="*/ 9222980 w 12192000"/>
+              <a:gd name="connsiteY92" fmla="*/ 4955397 h 6858000"/>
+              <a:gd name="connsiteX93" fmla="*/ 9268448 w 12192000"/>
+              <a:gd name="connsiteY93" fmla="*/ 4917173 h 6858000"/>
+              <a:gd name="connsiteX94" fmla="*/ 9442512 w 12192000"/>
+              <a:gd name="connsiteY94" fmla="*/ 4773251 h 6858000"/>
+              <a:gd name="connsiteX95" fmla="*/ 9590400 w 12192000"/>
+              <a:gd name="connsiteY95" fmla="*/ 4643756 h 6858000"/>
+              <a:gd name="connsiteX96" fmla="*/ 9513242 w 12192000"/>
+              <a:gd name="connsiteY96" fmla="*/ 4600073 h 6858000"/>
+              <a:gd name="connsiteX97" fmla="*/ 9617498 w 12192000"/>
+              <a:gd name="connsiteY97" fmla="*/ 4476430 h 6858000"/>
+              <a:gd name="connsiteX98" fmla="*/ 9949094 w 12192000"/>
+              <a:gd name="connsiteY98" fmla="*/ 4095364 h 6858000"/>
+              <a:gd name="connsiteX99" fmla="*/ 10094686 w 12192000"/>
+              <a:gd name="connsiteY99" fmla="*/ 4011507 h 6858000"/>
+              <a:gd name="connsiteX100" fmla="*/ 10271967 w 12192000"/>
+              <a:gd name="connsiteY100" fmla="*/ 3800497 h 6858000"/>
+              <a:gd name="connsiteX101" fmla="*/ 10297226 w 12192000"/>
+              <a:gd name="connsiteY101" fmla="*/ 3751742 h 6858000"/>
+              <a:gd name="connsiteX102" fmla="*/ 10260943 w 12192000"/>
+              <a:gd name="connsiteY102" fmla="*/ 3689723 h 6858000"/>
+              <a:gd name="connsiteX103" fmla="*/ 10233847 w 12192000"/>
+              <a:gd name="connsiteY103" fmla="*/ 3627319 h 6858000"/>
+              <a:gd name="connsiteX104" fmla="*/ 10269209 w 12192000"/>
+              <a:gd name="connsiteY104" fmla="*/ 3608986 h 6858000"/>
+              <a:gd name="connsiteX105" fmla="*/ 10496550 w 12192000"/>
+              <a:gd name="connsiteY105" fmla="*/ 3577393 h 6858000"/>
+              <a:gd name="connsiteX106" fmla="*/ 10364738 w 12192000"/>
+              <a:gd name="connsiteY106" fmla="*/ 3458823 h 6858000"/>
+              <a:gd name="connsiteX107" fmla="*/ 10132346 w 12192000"/>
+              <a:gd name="connsiteY107" fmla="*/ 3282137 h 6858000"/>
+              <a:gd name="connsiteX108" fmla="*/ 10026712 w 12192000"/>
+              <a:gd name="connsiteY108" fmla="*/ 3156543 h 6858000"/>
+              <a:gd name="connsiteX109" fmla="*/ 10014312 w 12192000"/>
+              <a:gd name="connsiteY109" fmla="*/ 3044213 h 6858000"/>
+              <a:gd name="connsiteX110" fmla="*/ 9806718 w 12192000"/>
+              <a:gd name="connsiteY110" fmla="*/ 2977907 h 6858000"/>
+              <a:gd name="connsiteX111" fmla="*/ 10001912 w 12192000"/>
+              <a:gd name="connsiteY111" fmla="*/ 2740374 h 6858000"/>
+              <a:gd name="connsiteX112" fmla="*/ 10021662 w 12192000"/>
+              <a:gd name="connsiteY112" fmla="*/ 2691231 h 6858000"/>
+              <a:gd name="connsiteX113" fmla="*/ 9904546 w 12192000"/>
+              <a:gd name="connsiteY113" fmla="*/ 2515322 h 6858000"/>
+              <a:gd name="connsiteX114" fmla="*/ 9885256 w 12192000"/>
+              <a:gd name="connsiteY114" fmla="*/ 2487240 h 6858000"/>
+              <a:gd name="connsiteX115" fmla="*/ 9842085 w 12192000"/>
+              <a:gd name="connsiteY115" fmla="*/ 2431074 h 6858000"/>
+              <a:gd name="connsiteX116" fmla="*/ 9718078 w 12192000"/>
+              <a:gd name="connsiteY116" fmla="*/ 2417424 h 6858000"/>
+              <a:gd name="connsiteX117" fmla="*/ 9782378 w 12192000"/>
+              <a:gd name="connsiteY117" fmla="*/ 2377641 h 6858000"/>
+              <a:gd name="connsiteX118" fmla="*/ 9907302 w 12192000"/>
+              <a:gd name="connsiteY118" fmla="*/ 2243078 h 6858000"/>
+              <a:gd name="connsiteX119" fmla="*/ 9824171 w 12192000"/>
+              <a:gd name="connsiteY119" fmla="*/ 2114365 h 6858000"/>
+              <a:gd name="connsiteX120" fmla="*/ 9818662 w 12192000"/>
+              <a:gd name="connsiteY120" fmla="*/ 2043377 h 6858000"/>
+              <a:gd name="connsiteX121" fmla="*/ 9958740 w 12192000"/>
+              <a:gd name="connsiteY121" fmla="*/ 1952499 h 6858000"/>
+              <a:gd name="connsiteX122" fmla="*/ 10064374 w 12192000"/>
+              <a:gd name="connsiteY122" fmla="*/ 1916615 h 6858000"/>
+              <a:gd name="connsiteX123" fmla="*/ 10113055 w 12192000"/>
+              <a:gd name="connsiteY123" fmla="*/ 1865131 h 6858000"/>
+              <a:gd name="connsiteX124" fmla="*/ 10055646 w 12192000"/>
+              <a:gd name="connsiteY124" fmla="*/ 1822227 h 6858000"/>
+              <a:gd name="connsiteX125" fmla="*/ 9800748 w 12192000"/>
+              <a:gd name="connsiteY125" fmla="*/ 1720036 h 6858000"/>
+              <a:gd name="connsiteX126" fmla="*/ 9938071 w 12192000"/>
+              <a:gd name="connsiteY126" fmla="*/ 1634617 h 6858000"/>
+              <a:gd name="connsiteX127" fmla="*/ 9220224 w 12192000"/>
+              <a:gd name="connsiteY127" fmla="*/ 1231709 h 6858000"/>
+              <a:gd name="connsiteX128" fmla="*/ 9133419 w 12192000"/>
+              <a:gd name="connsiteY128" fmla="*/ 1170083 h 6858000"/>
+              <a:gd name="connsiteX129" fmla="*/ 8672768 w 12192000"/>
+              <a:gd name="connsiteY129" fmla="*/ 1020699 h 6858000"/>
+              <a:gd name="connsiteX130" fmla="*/ 8198797 w 12192000"/>
+              <a:gd name="connsiteY130" fmla="*/ 915000 h 6858000"/>
+              <a:gd name="connsiteX131" fmla="*/ 8528095 w 12192000"/>
+              <a:gd name="connsiteY131" fmla="*/ 691898 h 6858000"/>
+              <a:gd name="connsiteX132" fmla="*/ 8025190 w 12192000"/>
+              <a:gd name="connsiteY132" fmla="*/ 640021 h 6858000"/>
+              <a:gd name="connsiteX133" fmla="*/ 7976047 w 12192000"/>
+              <a:gd name="connsiteY133" fmla="*/ 641584 h 6858000"/>
+              <a:gd name="connsiteX134" fmla="*/ 6988604 w 12192000"/>
+              <a:gd name="connsiteY134" fmla="*/ 607260 h 6858000"/>
+              <a:gd name="connsiteX135" fmla="*/ 5573116 w 12192000"/>
+              <a:gd name="connsiteY135" fmla="*/ 493368 h 6858000"/>
+              <a:gd name="connsiteX136" fmla="*/ 4401503 w 12192000"/>
+              <a:gd name="connsiteY136" fmla="*/ 425112 h 6858000"/>
+              <a:gd name="connsiteX137" fmla="*/ 3154109 w 12192000"/>
+              <a:gd name="connsiteY137" fmla="*/ 292499 h 6858000"/>
+              <a:gd name="connsiteX138" fmla="*/ 3094406 w 12192000"/>
+              <a:gd name="connsiteY138" fmla="*/ 283966 h 6858000"/>
+              <a:gd name="connsiteX139" fmla="*/ 0 w 12192000"/>
+              <a:gd name="connsiteY139" fmla="*/ 0 h 6858000"/>
+              <a:gd name="connsiteX140" fmla="*/ 12192000 w 12192000"/>
+              <a:gd name="connsiteY140" fmla="*/ 0 h 6858000"/>
+              <a:gd name="connsiteX141" fmla="*/ 12192000 w 12192000"/>
+              <a:gd name="connsiteY141" fmla="*/ 6858000 h 6858000"/>
+              <a:gd name="connsiteX142" fmla="*/ 0 w 12192000"/>
+              <a:gd name="connsiteY142" fmla="*/ 6858000 h 6858000"/>
+            </a:gdLst>
+            <a:ahLst/>
+            <a:cxnLst>
+              <a:cxn ang="0">
+                <a:pos x="connsiteX0" y="connsiteY0"/>
+              </a:cxn>
+              <a:cxn ang="0">
+                <a:pos x="connsiteX1" y="connsiteY1"/>
+              </a:cxn>
+              <a:cxn ang="0">
+                <a:pos x="connsiteX2" y="connsiteY2"/>
+              </a:cxn>
+              <a:cxn ang="0">
+                <a:pos x="connsiteX3" y="connsiteY3"/>
+              </a:cxn>
+              <a:cxn ang="0">
+                <a:pos x="connsiteX4" y="connsiteY4"/>
+              </a:cxn>
+              <a:cxn ang="0">
+                <a:pos x="connsiteX5" y="connsiteY5"/>
+              </a:cxn>
+              <a:cxn ang="0">
+                <a:pos x="connsiteX6" y="connsiteY6"/>
+              </a:cxn>
+              <a:cxn ang="0">
+                <a:pos x="connsiteX7" y="connsiteY7"/>
+              </a:cxn>
+              <a:cxn ang="0">
+                <a:pos x="connsiteX8" y="connsiteY8"/>
+              </a:cxn>
+              <a:cxn ang="0">
+                <a:pos x="connsiteX9" y="connsiteY9"/>
+              </a:cxn>
+              <a:cxn ang="0">
+                <a:pos x="connsiteX10" y="connsiteY10"/>
+              </a:cxn>
+              <a:cxn ang="0">
+                <a:pos x="connsiteX11" y="connsiteY11"/>
+              </a:cxn>
+              <a:cxn ang="0">
+                <a:pos x="connsiteX12" y="connsiteY12"/>
+              </a:cxn>
+              <a:cxn ang="0">
+                <a:pos x="connsiteX13" y="connsiteY13"/>
+              </a:cxn>
+              <a:cxn ang="0">
+                <a:pos x="connsiteX14" y="connsiteY14"/>
+              </a:cxn>
+              <a:cxn ang="0">
+                <a:pos x="connsiteX15" y="connsiteY15"/>
+              </a:cxn>
+              <a:cxn ang="0">
+                <a:pos x="connsiteX16" y="connsiteY16"/>
+              </a:cxn>
+              <a:cxn ang="0">
+                <a:pos x="connsiteX17" y="connsiteY17"/>
+              </a:cxn>
+              <a:cxn ang="0">
+                <a:pos x="connsiteX18" y="connsiteY18"/>
+              </a:cxn>
+              <a:cxn ang="0">
+                <a:pos x="connsiteX19" y="connsiteY19"/>
+              </a:cxn>
+              <a:cxn ang="0">
+                <a:pos x="connsiteX20" y="connsiteY20"/>
+              </a:cxn>
+              <a:cxn ang="0">
+                <a:pos x="connsiteX21" y="connsiteY21"/>
+              </a:cxn>
+              <a:cxn ang="0">
+                <a:pos x="connsiteX22" y="connsiteY22"/>
+              </a:cxn>
+              <a:cxn ang="0">
+                <a:pos x="connsiteX23" y="connsiteY23"/>
+              </a:cxn>
+              <a:cxn ang="0">
+                <a:pos x="connsiteX24" y="connsiteY24"/>
+              </a:cxn>
+              <a:cxn ang="0">
+                <a:pos x="connsiteX25" y="connsiteY25"/>
+              </a:cxn>
+              <a:cxn ang="0">
+                <a:pos x="connsiteX26" y="connsiteY26"/>
+              </a:cxn>
+              <a:cxn ang="0">
+                <a:pos x="connsiteX27" y="connsiteY27"/>
+              </a:cxn>
+              <a:cxn ang="0">
+                <a:pos x="connsiteX28" y="connsiteY28"/>
+              </a:cxn>
+              <a:cxn ang="0">
+                <a:pos x="connsiteX29" y="connsiteY29"/>
+              </a:cxn>
+              <a:cxn ang="0">
+                <a:pos x="connsiteX30" y="connsiteY30"/>
+              </a:cxn>
+              <a:cxn ang="0">
+                <a:pos x="connsiteX31" y="connsiteY31"/>
+              </a:cxn>
+              <a:cxn ang="0">
+                <a:pos x="connsiteX32" y="connsiteY32"/>
+              </a:cxn>
+              <a:cxn ang="0">
+                <a:pos x="connsiteX33" y="connsiteY33"/>
+              </a:cxn>
+              <a:cxn ang="0">
+                <a:pos x="connsiteX34" y="connsiteY34"/>
+              </a:cxn>
+              <a:cxn ang="0">
+                <a:pos x="connsiteX35" y="connsiteY35"/>
+              </a:cxn>
+              <a:cxn ang="0">
+                <a:pos x="connsiteX36" y="connsiteY36"/>
+              </a:cxn>
+              <a:cxn ang="0">
+                <a:pos x="connsiteX37" y="connsiteY37"/>
+              </a:cxn>
+              <a:cxn ang="0">
+                <a:pos x="connsiteX38" y="connsiteY38"/>
+              </a:cxn>
+              <a:cxn ang="0">
+                <a:pos x="connsiteX39" y="connsiteY39"/>
+              </a:cxn>
+              <a:cxn ang="0">
+                <a:pos x="connsiteX40" y="connsiteY40"/>
+              </a:cxn>
+              <a:cxn ang="0">
+                <a:pos x="connsiteX41" y="connsiteY41"/>
+              </a:cxn>
+              <a:cxn ang="0">
+                <a:pos x="connsiteX42" y="connsiteY42"/>
+              </a:cxn>
+              <a:cxn ang="0">
+                <a:pos x="connsiteX43" y="connsiteY43"/>
+              </a:cxn>
+              <a:cxn ang="0">
+                <a:pos x="connsiteX44" y="connsiteY44"/>
+              </a:cxn>
+              <a:cxn ang="0">
+                <a:pos x="connsiteX45" y="connsiteY45"/>
+              </a:cxn>
+              <a:cxn ang="0">
+                <a:pos x="connsiteX46" y="connsiteY46"/>
+              </a:cxn>
+              <a:cxn ang="0">
+                <a:pos x="connsiteX47" y="connsiteY47"/>
+              </a:cxn>
+              <a:cxn ang="0">
+                <a:pos x="connsiteX48" y="connsiteY48"/>
+              </a:cxn>
+              <a:cxn ang="0">
+                <a:pos x="connsiteX49" y="connsiteY49"/>
+              </a:cxn>
+              <a:cxn ang="0">
+                <a:pos x="connsiteX50" y="connsiteY50"/>
+              </a:cxn>
+              <a:cxn ang="0">
+                <a:pos x="connsiteX51" y="connsiteY51"/>
+              </a:cxn>
+              <a:cxn ang="0">
+                <a:pos x="connsiteX52" y="connsiteY52"/>
+              </a:cxn>
+              <a:cxn ang="0">
+                <a:pos x="connsiteX53" y="connsiteY53"/>
+              </a:cxn>
+              <a:cxn ang="0">
+                <a:pos x="connsiteX54" y="connsiteY54"/>
+              </a:cxn>
+              <a:cxn ang="0">
+                <a:pos x="connsiteX55" y="connsiteY55"/>
+              </a:cxn>
+              <a:cxn ang="0">
+                <a:pos x="connsiteX56" y="connsiteY56"/>
+              </a:cxn>
+              <a:cxn ang="0">
+                <a:pos x="connsiteX57" y="connsiteY57"/>
+              </a:cxn>
+              <a:cxn ang="0">
+                <a:pos x="connsiteX58" y="connsiteY58"/>
+              </a:cxn>
+              <a:cxn ang="0">
+                <a:pos x="connsiteX59" y="connsiteY59"/>
+              </a:cxn>
+              <a:cxn ang="0">
+                <a:pos x="connsiteX60" y="connsiteY60"/>
+              </a:cxn>
+              <a:cxn ang="0">
+                <a:pos x="connsiteX61" y="connsiteY61"/>
+              </a:cxn>
+              <a:cxn ang="0">
+                <a:pos x="connsiteX62" y="connsiteY62"/>
+              </a:cxn>
+              <a:cxn ang="0">
+                <a:pos x="connsiteX63" y="connsiteY63"/>
+              </a:cxn>
+              <a:cxn ang="0">
+                <a:pos x="connsiteX64" y="connsiteY64"/>
+              </a:cxn>
+              <a:cxn ang="0">
+                <a:pos x="connsiteX65" y="connsiteY65"/>
+              </a:cxn>
+              <a:cxn ang="0">
+                <a:pos x="connsiteX66" y="connsiteY66"/>
+              </a:cxn>
+              <a:cxn ang="0">
+                <a:pos x="connsiteX67" y="connsiteY67"/>
+              </a:cxn>
+              <a:cxn ang="0">
+                <a:pos x="connsiteX68" y="connsiteY68"/>
+              </a:cxn>
+              <a:cxn ang="0">
+                <a:pos x="connsiteX69" y="connsiteY69"/>
+              </a:cxn>
+              <a:cxn ang="0">
+                <a:pos x="connsiteX70" y="connsiteY70"/>
+              </a:cxn>
+              <a:cxn ang="0">
+                <a:pos x="connsiteX71" y="connsiteY71"/>
+              </a:cxn>
+              <a:cxn ang="0">
+                <a:pos x="connsiteX72" y="connsiteY72"/>
+              </a:cxn>
+              <a:cxn ang="0">
+                <a:pos x="connsiteX73" y="connsiteY73"/>
+              </a:cxn>
+              <a:cxn ang="0">
+                <a:pos x="connsiteX74" y="connsiteY74"/>
+              </a:cxn>
+              <a:cxn ang="0">
+                <a:pos x="connsiteX75" y="connsiteY75"/>
+              </a:cxn>
+              <a:cxn ang="0">
+                <a:pos x="connsiteX76" y="connsiteY76"/>
+              </a:cxn>
+              <a:cxn ang="0">
+                <a:pos x="connsiteX77" y="connsiteY77"/>
+              </a:cxn>
+              <a:cxn ang="0">
+                <a:pos x="connsiteX78" y="connsiteY78"/>
+              </a:cxn>
+              <a:cxn ang="0">
+                <a:pos x="connsiteX79" y="connsiteY79"/>
+              </a:cxn>
+              <a:cxn ang="0">
+                <a:pos x="connsiteX80" y="connsiteY80"/>
+              </a:cxn>
+              <a:cxn ang="0">
+                <a:pos x="connsiteX81" y="connsiteY81"/>
+              </a:cxn>
+              <a:cxn ang="0">
+                <a:pos x="connsiteX82" y="connsiteY82"/>
+              </a:cxn>
+              <a:cxn ang="0">
+                <a:pos x="connsiteX83" y="connsiteY83"/>
+              </a:cxn>
+              <a:cxn ang="0">
+                <a:pos x="connsiteX84" y="connsiteY84"/>
+              </a:cxn>
+              <a:cxn ang="0">
+                <a:pos x="connsiteX85" y="connsiteY85"/>
+              </a:cxn>
+              <a:cxn ang="0">
+                <a:pos x="connsiteX86" y="connsiteY86"/>
+              </a:cxn>
+              <a:cxn ang="0">
+                <a:pos x="connsiteX87" y="connsiteY87"/>
+              </a:cxn>
+              <a:cxn ang="0">
+                <a:pos x="connsiteX88" y="connsiteY88"/>
+              </a:cxn>
+              <a:cxn ang="0">
+                <a:pos x="connsiteX89" y="connsiteY89"/>
+              </a:cxn>
+              <a:cxn ang="0">
+                <a:pos x="connsiteX90" y="connsiteY90"/>
+              </a:cxn>
+              <a:cxn ang="0">
+                <a:pos x="connsiteX91" y="connsiteY91"/>
+              </a:cxn>
+              <a:cxn ang="0">
+                <a:pos x="connsiteX92" y="connsiteY92"/>
+              </a:cxn>
+              <a:cxn ang="0">
+                <a:pos x="connsiteX93" y="connsiteY93"/>
+              </a:cxn>
+              <a:cxn ang="0">
+                <a:pos x="connsiteX94" y="connsiteY94"/>
+              </a:cxn>
+              <a:cxn ang="0">
+                <a:pos x="connsiteX95" y="connsiteY95"/>
+              </a:cxn>
+              <a:cxn ang="0">
+                <a:pos x="connsiteX96" y="connsiteY96"/>
+              </a:cxn>
+              <a:cxn ang="0">
+                <a:pos x="connsiteX97" y="connsiteY97"/>
+              </a:cxn>
+              <a:cxn ang="0">
+                <a:pos x="connsiteX98" y="connsiteY98"/>
+              </a:cxn>
+              <a:cxn ang="0">
+                <a:pos x="connsiteX99" y="connsiteY99"/>
+              </a:cxn>
+              <a:cxn ang="0">
+                <a:pos x="connsiteX100" y="connsiteY100"/>
+              </a:cxn>
+              <a:cxn ang="0">
+                <a:pos x="connsiteX101" y="connsiteY101"/>
+              </a:cxn>
+              <a:cxn ang="0">
+                <a:pos x="connsiteX102" y="connsiteY102"/>
+              </a:cxn>
+              <a:cxn ang="0">
+                <a:pos x="connsiteX103" y="connsiteY103"/>
+              </a:cxn>
+              <a:cxn ang="0">
+                <a:pos x="connsiteX104" y="connsiteY104"/>
+              </a:cxn>
+              <a:cxn ang="0">
+                <a:pos x="connsiteX105" y="connsiteY105"/>
+              </a:cxn>
+              <a:cxn ang="0">
+                <a:pos x="connsiteX106" y="connsiteY106"/>
+              </a:cxn>
+              <a:cxn ang="0">
+                <a:pos x="connsiteX107" y="connsiteY107"/>
+              </a:cxn>
+              <a:cxn ang="0">
+                <a:pos x="connsiteX108" y="connsiteY108"/>
+              </a:cxn>
+              <a:cxn ang="0">
+                <a:pos x="connsiteX109" y="connsiteY109"/>
+              </a:cxn>
+              <a:cxn ang="0">
+                <a:pos x="connsiteX110" y="connsiteY110"/>
+              </a:cxn>
+              <a:cxn ang="0">
+                <a:pos x="connsiteX111" y="connsiteY111"/>
+              </a:cxn>
+              <a:cxn ang="0">
+                <a:pos x="connsiteX112" y="connsiteY112"/>
+              </a:cxn>
+              <a:cxn ang="0">
+                <a:pos x="connsiteX113" y="connsiteY113"/>
+              </a:cxn>
+              <a:cxn ang="0">
+                <a:pos x="connsiteX114" y="connsiteY114"/>
+              </a:cxn>
+              <a:cxn ang="0">
+                <a:pos x="connsiteX115" y="connsiteY115"/>
+              </a:cxn>
+              <a:cxn ang="0">
+                <a:pos x="connsiteX116" y="connsiteY116"/>
+              </a:cxn>
+              <a:cxn ang="0">
+                <a:pos x="connsiteX117" y="connsiteY117"/>
+              </a:cxn>
+              <a:cxn ang="0">
+                <a:pos x="connsiteX118" y="connsiteY118"/>
+              </a:cxn>
+              <a:cxn ang="0">
+                <a:pos x="connsiteX119" y="connsiteY119"/>
+              </a:cxn>
+              <a:cxn ang="0">
+                <a:pos x="connsiteX120" y="connsiteY120"/>
+              </a:cxn>
+              <a:cxn ang="0">
+                <a:pos x="connsiteX121" y="connsiteY121"/>
+              </a:cxn>
+              <a:cxn ang="0">
+                <a:pos x="connsiteX122" y="connsiteY122"/>
+              </a:cxn>
+              <a:cxn ang="0">
+                <a:pos x="connsiteX123" y="connsiteY123"/>
+              </a:cxn>
+              <a:cxn ang="0">
+                <a:pos x="connsiteX124" y="connsiteY124"/>
+              </a:cxn>
+              <a:cxn ang="0">
+                <a:pos x="connsiteX125" y="connsiteY125"/>
+              </a:cxn>
+              <a:cxn ang="0">
+                <a:pos x="connsiteX126" y="connsiteY126"/>
+              </a:cxn>
+              <a:cxn ang="0">
+                <a:pos x="connsiteX127" y="connsiteY127"/>
+              </a:cxn>
+              <a:cxn ang="0">
+                <a:pos x="connsiteX128" y="connsiteY128"/>
+              </a:cxn>
+              <a:cxn ang="0">
+                <a:pos x="connsiteX129" y="connsiteY129"/>
+              </a:cxn>
+              <a:cxn ang="0">
+                <a:pos x="connsiteX130" y="connsiteY130"/>
+              </a:cxn>
+              <a:cxn ang="0">
+                <a:pos x="connsiteX131" y="connsiteY131"/>
+              </a:cxn>
+              <a:cxn ang="0">
+                <a:pos x="connsiteX132" y="connsiteY132"/>
+              </a:cxn>
+              <a:cxn ang="0">
+                <a:pos x="connsiteX133" y="connsiteY133"/>
+              </a:cxn>
+              <a:cxn ang="0">
+                <a:pos x="connsiteX134" y="connsiteY134"/>
+              </a:cxn>
+              <a:cxn ang="0">
+                <a:pos x="connsiteX135" y="connsiteY135"/>
+              </a:cxn>
+              <a:cxn ang="0">
+                <a:pos x="connsiteX136" y="connsiteY136"/>
+              </a:cxn>
+              <a:cxn ang="0">
+                <a:pos x="connsiteX137" y="connsiteY137"/>
+              </a:cxn>
+              <a:cxn ang="0">
+                <a:pos x="connsiteX138" y="connsiteY138"/>
+              </a:cxn>
+              <a:cxn ang="0">
+                <a:pos x="connsiteX139" y="connsiteY139"/>
+              </a:cxn>
+              <a:cxn ang="0">
+                <a:pos x="connsiteX140" y="connsiteY140"/>
+              </a:cxn>
+              <a:cxn ang="0">
+                <a:pos x="connsiteX141" y="connsiteY141"/>
+              </a:cxn>
+              <a:cxn ang="0">
+                <a:pos x="connsiteX142" y="connsiteY142"/>
+              </a:cxn>
+            </a:cxnLst>
+            <a:rect l="l" t="t" r="r" b="b"/>
+            <a:pathLst>
+              <a:path w="12192000" h="6858000">
+                <a:moveTo>
+                  <a:pt x="3094406" y="283966"/>
+                </a:moveTo>
+                <a:cubicBezTo>
+                  <a:pt x="3074312" y="283528"/>
+                  <a:pt x="3054907" y="288795"/>
+                  <a:pt x="3038833" y="309661"/>
+                </a:cubicBezTo>
+                <a:cubicBezTo>
+                  <a:pt x="3124259" y="364657"/>
+                  <a:pt x="3233105" y="343983"/>
+                  <a:pt x="3348384" y="406000"/>
+                </a:cubicBezTo>
+                <a:cubicBezTo>
+                  <a:pt x="3161001" y="386497"/>
+                  <a:pt x="3012653" y="370896"/>
+                  <a:pt x="2864309" y="355295"/>
+                </a:cubicBezTo>
+                <a:cubicBezTo>
+                  <a:pt x="2861553" y="366216"/>
+                  <a:pt x="2858796" y="377136"/>
+                  <a:pt x="2856039" y="388058"/>
+                </a:cubicBezTo>
+                <a:cubicBezTo>
+                  <a:pt x="3045722" y="411070"/>
+                  <a:pt x="3221166" y="470356"/>
+                  <a:pt x="3405794" y="512089"/>
+                </a:cubicBezTo>
+                <a:cubicBezTo>
+                  <a:pt x="3388799" y="537835"/>
+                  <a:pt x="3371808" y="532763"/>
+                  <a:pt x="3356651" y="531204"/>
+                </a:cubicBezTo>
+                <a:cubicBezTo>
+                  <a:pt x="3257907" y="521062"/>
+                  <a:pt x="3159164" y="510922"/>
+                  <a:pt x="3064552" y="483228"/>
+                </a:cubicBezTo>
+                <a:cubicBezTo>
+                  <a:pt x="3043427" y="476987"/>
+                  <a:pt x="3017704" y="476987"/>
+                  <a:pt x="3005765" y="495708"/>
+                </a:cubicBezTo>
+                <a:cubicBezTo>
+                  <a:pt x="2988771" y="522231"/>
+                  <a:pt x="3013113" y="539393"/>
+                  <a:pt x="3034700" y="553823"/>
+                </a:cubicBezTo>
+                <a:cubicBezTo>
+                  <a:pt x="3072360" y="578787"/>
+                  <a:pt x="3117827" y="571767"/>
+                  <a:pt x="3161459" y="576445"/>
+                </a:cubicBezTo>
+                <a:cubicBezTo>
+                  <a:pt x="3277655" y="588537"/>
+                  <a:pt x="3333228" y="626370"/>
+                  <a:pt x="3358949" y="712961"/>
+                </a:cubicBezTo>
+                <a:cubicBezTo>
+                  <a:pt x="3256987" y="677857"/>
+                  <a:pt x="3158703" y="721151"/>
+                  <a:pt x="3059960" y="696576"/>
+                </a:cubicBezTo>
+                <a:cubicBezTo>
+                  <a:pt x="3034240" y="690338"/>
+                  <a:pt x="2993364" y="699698"/>
+                  <a:pt x="3007143" y="729732"/>
+                </a:cubicBezTo>
+                <a:cubicBezTo>
+                  <a:pt x="3020003" y="757814"/>
+                  <a:pt x="3062716" y="778096"/>
+                  <a:pt x="2986935" y="772635"/>
+                </a:cubicBezTo>
+                <a:cubicBezTo>
+                  <a:pt x="2932740" y="768735"/>
+                  <a:pt x="2826647" y="800329"/>
+                  <a:pt x="2871197" y="808127"/>
+                </a:cubicBezTo>
+                <a:cubicBezTo>
+                  <a:pt x="2927228" y="817881"/>
+                  <a:pt x="2981883" y="831921"/>
+                  <a:pt x="3053071" y="847913"/>
+                </a:cubicBezTo>
+                <a:cubicBezTo>
+                  <a:pt x="2974533" y="874043"/>
+                  <a:pt x="2918042" y="868584"/>
+                  <a:pt x="2858796" y="847913"/>
+                </a:cubicBezTo>
+                <a:cubicBezTo>
+                  <a:pt x="2787150" y="822949"/>
+                  <a:pt x="2693916" y="792528"/>
+                  <a:pt x="2635588" y="820611"/>
+                </a:cubicBezTo>
+                <a:cubicBezTo>
+                  <a:pt x="2548326" y="862734"/>
+                  <a:pt x="2475760" y="836211"/>
+                  <a:pt x="2397683" y="829190"/>
+                </a:cubicBezTo>
+                <a:cubicBezTo>
+                  <a:pt x="2238775" y="814759"/>
+                  <a:pt x="2081241" y="790576"/>
+                  <a:pt x="1921874" y="778877"/>
+                </a:cubicBezTo>
+                <a:cubicBezTo>
+                  <a:pt x="1858036" y="774195"/>
+                  <a:pt x="1789143" y="751964"/>
+                  <a:pt x="1695450" y="782386"/>
+                </a:cubicBezTo>
+                <a:cubicBezTo>
+                  <a:pt x="2119822" y="938012"/>
+                  <a:pt x="2575423" y="928262"/>
+                  <a:pt x="2954324" y="1120940"/>
+                </a:cubicBezTo>
+                <a:cubicBezTo>
+                  <a:pt x="2938251" y="1139269"/>
+                  <a:pt x="2856502" y="1191535"/>
+                  <a:pt x="2890028" y="1195435"/>
+                </a:cubicBezTo>
+                <a:cubicBezTo>
+                  <a:pt x="2984178" y="1206748"/>
+                  <a:pt x="3067767" y="1244971"/>
+                  <a:pt x="3153652" y="1276563"/>
+                </a:cubicBezTo>
+                <a:cubicBezTo>
+                  <a:pt x="3190855" y="1290216"/>
+                  <a:pt x="3235862" y="1308157"/>
+                  <a:pt x="3218410" y="1356911"/>
+                </a:cubicBezTo>
+                <a:cubicBezTo>
+                  <a:pt x="3186719" y="1370562"/>
+                  <a:pt x="3163296" y="1351451"/>
+                  <a:pt x="3137118" y="1349891"/>
+                </a:cubicBezTo>
+                <a:cubicBezTo>
+                  <a:pt x="3110480" y="1348331"/>
+                  <a:pt x="3050773" y="1358471"/>
+                  <a:pt x="3067309" y="1365102"/>
+                </a:cubicBezTo>
+                <a:cubicBezTo>
+                  <a:pt x="3142629" y="1395136"/>
+                  <a:pt x="3007143" y="1467292"/>
+                  <a:pt x="3096243" y="1467292"/>
+                </a:cubicBezTo>
+                <a:cubicBezTo>
+                  <a:pt x="3245506" y="1467681"/>
+                  <a:pt x="3324961" y="1595613"/>
+                  <a:pt x="3468716" y="1599125"/>
+                </a:cubicBezTo>
+                <a:cubicBezTo>
+                  <a:pt x="3491677" y="1599513"/>
+                  <a:pt x="3502700" y="1622137"/>
+                  <a:pt x="3502241" y="1642029"/>
+                </a:cubicBezTo>
+                <a:cubicBezTo>
+                  <a:pt x="3502241" y="1665822"/>
+                  <a:pt x="3481116" y="1670112"/>
+                  <a:pt x="3457692" y="1672453"/>
+                </a:cubicBezTo>
+                <a:cubicBezTo>
+                  <a:pt x="3421868" y="1675962"/>
+                  <a:pt x="3384667" y="1642029"/>
+                  <a:pt x="3337362" y="1688053"/>
+                </a:cubicBezTo>
+                <a:cubicBezTo>
+                  <a:pt x="3422329" y="1714966"/>
+                  <a:pt x="3507294" y="1741878"/>
+                  <a:pt x="3505915" y="1834318"/>
+                </a:cubicBezTo>
+                <a:cubicBezTo>
+                  <a:pt x="3505457" y="1859279"/>
+                  <a:pt x="3540820" y="1868640"/>
+                  <a:pt x="3567458" y="1874880"/>
+                </a:cubicBezTo>
+                <a:cubicBezTo>
+                  <a:pt x="3611549" y="1885023"/>
+                  <a:pt x="3648750" y="1902965"/>
+                  <a:pt x="3672634" y="1937678"/>
+                </a:cubicBezTo>
+                <a:cubicBezTo>
+                  <a:pt x="3672172" y="1944308"/>
+                  <a:pt x="3671715" y="1951329"/>
+                  <a:pt x="3674470" y="1956789"/>
+                </a:cubicBezTo>
+                <a:cubicBezTo>
+                  <a:pt x="3666664" y="2040646"/>
+                  <a:pt x="3602363" y="2038306"/>
+                  <a:pt x="3531176" y="2024266"/>
+                </a:cubicBezTo>
+                <a:cubicBezTo>
+                  <a:pt x="3446211" y="2007103"/>
+                  <a:pt x="3362164" y="1975900"/>
+                  <a:pt x="3272604" y="2005933"/>
+                </a:cubicBezTo>
+                <a:cubicBezTo>
+                  <a:pt x="3398905" y="2046107"/>
+                  <a:pt x="3536229" y="2049228"/>
+                  <a:pt x="3654720" y="2106564"/>
+                </a:cubicBezTo>
+                <a:cubicBezTo>
+                  <a:pt x="3221166" y="2117095"/>
+                  <a:pt x="2838130" y="1936116"/>
+                  <a:pt x="2417892" y="1866690"/>
+                </a:cubicBezTo>
+                <a:cubicBezTo>
+                  <a:pt x="2432130" y="1913105"/>
+                  <a:pt x="2466114" y="1922465"/>
+                  <a:pt x="2496888" y="1929487"/>
+                </a:cubicBezTo>
+                <a:cubicBezTo>
+                  <a:pt x="2652123" y="1964590"/>
+                  <a:pt x="2788067" y="2034408"/>
+                  <a:pt x="2929526" y="2094862"/>
+                </a:cubicBezTo>
+                <a:cubicBezTo>
+                  <a:pt x="2987851" y="2119825"/>
+                  <a:pt x="3030106" y="2144789"/>
+                  <a:pt x="3052152" y="2198613"/>
+                </a:cubicBezTo>
+                <a:cubicBezTo>
+                  <a:pt x="3071903" y="2247367"/>
+                  <a:pt x="3110021" y="2269990"/>
+                  <a:pt x="3180748" y="2255948"/>
+                </a:cubicBezTo>
+                <a:cubicBezTo>
+                  <a:pt x="3238157" y="2244246"/>
+                  <a:pt x="3301078" y="2250487"/>
+                  <a:pt x="3361244" y="2254777"/>
+                </a:cubicBezTo>
+                <a:cubicBezTo>
+                  <a:pt x="3430596" y="2259459"/>
+                  <a:pt x="3508213" y="2314455"/>
+                  <a:pt x="3489382" y="2342926"/>
+                </a:cubicBezTo>
+                <a:cubicBezTo>
+                  <a:pt x="3457233" y="2391292"/>
+                  <a:pt x="3403498" y="2367110"/>
+                  <a:pt x="3355733" y="2361649"/>
+                </a:cubicBezTo>
+                <a:cubicBezTo>
+                  <a:pt x="3301537" y="2355018"/>
+                  <a:pt x="3200957" y="2341367"/>
+                  <a:pt x="3199121" y="2347216"/>
+                </a:cubicBezTo>
+                <a:cubicBezTo>
+                  <a:pt x="3163754" y="2468518"/>
+                  <a:pt x="2914827" y="2362819"/>
+                  <a:pt x="2861091" y="2351896"/>
+                </a:cubicBezTo>
+                <a:cubicBezTo>
+                  <a:pt x="2794038" y="2338245"/>
+                  <a:pt x="2731116" y="2363208"/>
+                  <a:pt x="2667278" y="2369058"/>
+                </a:cubicBezTo>
+                <a:cubicBezTo>
+                  <a:pt x="2610328" y="2374518"/>
+                  <a:pt x="2288376" y="2391292"/>
+                  <a:pt x="2221781" y="2339805"/>
+                </a:cubicBezTo>
+                <a:cubicBezTo>
+                  <a:pt x="2212595" y="2379978"/>
+                  <a:pt x="2231884" y="2396361"/>
+                  <a:pt x="2247961" y="2414693"/>
+                </a:cubicBezTo>
+                <a:cubicBezTo>
+                  <a:pt x="2270465" y="2440824"/>
+                  <a:pt x="2274138" y="2459157"/>
+                  <a:pt x="2231425" y="2479828"/>
+                </a:cubicBezTo>
+                <a:cubicBezTo>
+                  <a:pt x="2109717" y="2539115"/>
+                  <a:pt x="2111557" y="2541065"/>
+                  <a:pt x="2224996" y="2621414"/>
+                </a:cubicBezTo>
+                <a:cubicBezTo>
+                  <a:pt x="2230509" y="2624923"/>
+                  <a:pt x="2228211" y="2636624"/>
+                  <a:pt x="2229131" y="2644426"/>
+                </a:cubicBezTo>
+                <a:cubicBezTo>
+                  <a:pt x="2199276" y="2656906"/>
+                  <a:pt x="2164373" y="2625703"/>
+                  <a:pt x="2129466" y="2659247"/>
+                </a:cubicBezTo>
+                <a:cubicBezTo>
+                  <a:pt x="2281487" y="2806680"/>
+                  <a:pt x="2513421" y="2842953"/>
+                  <a:pt x="2723312" y="2953726"/>
+                </a:cubicBezTo>
+                <a:cubicBezTo>
+                  <a:pt x="2553377" y="2990389"/>
+                  <a:pt x="2451419" y="2862456"/>
+                  <a:pt x="2326496" y="2878838"/>
+                </a:cubicBezTo>
+                <a:cubicBezTo>
+                  <a:pt x="2264036" y="2919012"/>
+                  <a:pt x="2449582" y="2983367"/>
+                  <a:pt x="2272759" y="3002480"/>
+                </a:cubicBezTo>
+                <a:cubicBezTo>
+                  <a:pt x="2349461" y="3037583"/>
+                  <a:pt x="2406411" y="3071905"/>
+                  <a:pt x="2459226" y="3112471"/>
+                </a:cubicBezTo>
+                <a:cubicBezTo>
+                  <a:pt x="2553377" y="3185016"/>
+                  <a:pt x="2571749" y="3232602"/>
+                  <a:pt x="2528117" y="3330111"/>
+                </a:cubicBezTo>
+                <a:cubicBezTo>
+                  <a:pt x="2499642" y="3394076"/>
+                  <a:pt x="2457848" y="3452973"/>
+                  <a:pt x="2494590" y="3529029"/>
+                </a:cubicBezTo>
+                <a:cubicBezTo>
+                  <a:pt x="2520308" y="3581294"/>
+                  <a:pt x="2510206" y="3615617"/>
+                  <a:pt x="2414677" y="3592215"/>
+                </a:cubicBezTo>
+                <a:cubicBezTo>
+                  <a:pt x="2311799" y="3567251"/>
+                  <a:pt x="2273221" y="3614057"/>
+                  <a:pt x="2298940" y="3705716"/>
+                </a:cubicBezTo>
+                <a:cubicBezTo>
+                  <a:pt x="2315473" y="3764612"/>
+                  <a:pt x="2298020" y="3782553"/>
+                  <a:pt x="2227294" y="3775921"/>
+                </a:cubicBezTo>
+                <a:cubicBezTo>
+                  <a:pt x="2149215" y="3768512"/>
+                  <a:pt x="2074811" y="3729898"/>
+                  <a:pt x="1978366" y="3748620"/>
+                </a:cubicBezTo>
+                <a:cubicBezTo>
+                  <a:pt x="2055522" y="3855492"/>
+                  <a:pt x="2220403" y="3825068"/>
+                  <a:pt x="2310421" y="3926868"/>
+                </a:cubicBezTo>
+                <a:cubicBezTo>
+                  <a:pt x="2202950" y="3927259"/>
+                  <a:pt x="2120739" y="3926868"/>
+                  <a:pt x="2041285" y="3904635"/>
+                </a:cubicBezTo>
+                <a:cubicBezTo>
+                  <a:pt x="2008216" y="3895664"/>
+                  <a:pt x="1971934" y="3886305"/>
+                  <a:pt x="1953565" y="3917116"/>
+                </a:cubicBezTo>
+                <a:cubicBezTo>
+                  <a:pt x="1931978" y="3954170"/>
+                  <a:pt x="1976527" y="3968211"/>
+                  <a:pt x="2003623" y="3974842"/>
+                </a:cubicBezTo>
+                <a:cubicBezTo>
+                  <a:pt x="2079866" y="3993563"/>
+                  <a:pt x="2138192" y="4038028"/>
+                  <a:pt x="2201114" y="4072742"/>
+                </a:cubicBezTo>
+                <a:cubicBezTo>
+                  <a:pt x="2339356" y="4148800"/>
+                  <a:pt x="2490917" y="4212375"/>
+                  <a:pt x="2608032" y="4337967"/>
+                </a:cubicBezTo>
+                <a:cubicBezTo>
+                  <a:pt x="2460606" y="4305983"/>
+                  <a:pt x="2350838" y="4231487"/>
+                  <a:pt x="2213973" y="4216277"/>
+                </a:cubicBezTo>
+                <a:cubicBezTo>
+                  <a:pt x="2332467" y="4330557"/>
+                  <a:pt x="2484945" y="4405834"/>
+                  <a:pt x="2629158" y="4488911"/>
+                </a:cubicBezTo>
+                <a:cubicBezTo>
+                  <a:pt x="2670494" y="4512315"/>
+                  <a:pt x="2712289" y="4528306"/>
+                  <a:pt x="2721471" y="4579399"/>
+                </a:cubicBezTo>
+                <a:cubicBezTo>
+                  <a:pt x="2739385" y="4678470"/>
+                  <a:pt x="2793121" y="4760378"/>
+                  <a:pt x="2907939" y="4804062"/>
+                </a:cubicBezTo>
+                <a:cubicBezTo>
+                  <a:pt x="2908859" y="4804452"/>
+                  <a:pt x="2902428" y="4819274"/>
+                  <a:pt x="2898753" y="4829414"/>
+                </a:cubicBezTo>
+                <a:cubicBezTo>
+                  <a:pt x="2828485" y="4832536"/>
+                  <a:pt x="2772912" y="4774028"/>
+                  <a:pt x="2683352" y="4793141"/>
+                </a:cubicBezTo>
+                <a:cubicBezTo>
+                  <a:pt x="2769239" y="4872708"/>
+                  <a:pt x="2840885" y="4944087"/>
+                  <a:pt x="2962594" y="4981920"/>
+                </a:cubicBezTo>
+                <a:cubicBezTo>
+                  <a:pt x="3059960" y="5011952"/>
+                  <a:pt x="3180289" y="5029503"/>
+                  <a:pt x="3251019" y="5127012"/>
+                </a:cubicBezTo>
+                <a:cubicBezTo>
+                  <a:pt x="3168808" y="5146126"/>
+                  <a:pt x="3107723" y="5121944"/>
+                  <a:pt x="3046180" y="5104781"/>
+                </a:cubicBezTo>
+                <a:cubicBezTo>
+                  <a:pt x="2952030" y="5078258"/>
+                  <a:pt x="2858796" y="5048226"/>
+                  <a:pt x="2764646" y="5021703"/>
+                </a:cubicBezTo>
+                <a:cubicBezTo>
+                  <a:pt x="2728821" y="5011563"/>
+                  <a:pt x="2689782" y="5004540"/>
+                  <a:pt x="2666820" y="5052905"/>
+                </a:cubicBezTo>
+                <a:cubicBezTo>
+                  <a:pt x="2786691" y="5063047"/>
+                  <a:pt x="2858337" y="5128575"/>
+                  <a:pt x="2933657" y="5190198"/>
+                </a:cubicBezTo>
+                <a:cubicBezTo>
+                  <a:pt x="2975911" y="5224912"/>
+                  <a:pt x="3010358" y="5271328"/>
+                  <a:pt x="3086598" y="5253776"/>
+                </a:cubicBezTo>
+                <a:cubicBezTo>
+                  <a:pt x="3126554" y="5244415"/>
+                  <a:pt x="3151814" y="5270547"/>
+                  <a:pt x="3147680" y="5302531"/>
+                </a:cubicBezTo>
+                <a:cubicBezTo>
+                  <a:pt x="3132525" y="5415251"/>
+                  <a:pt x="3225759" y="5454645"/>
+                  <a:pt x="3322204" y="5476487"/>
+                </a:cubicBezTo>
+                <a:cubicBezTo>
+                  <a:pt x="3504998" y="5517440"/>
+                  <a:pt x="3657018" y="5613779"/>
+                  <a:pt x="3834758" y="5666434"/>
+                </a:cubicBezTo>
+                <a:cubicBezTo>
+                  <a:pt x="4007445" y="5717529"/>
+                  <a:pt x="4141095" y="5838830"/>
+                  <a:pt x="4314240" y="5902409"/>
+                </a:cubicBezTo>
+                <a:cubicBezTo>
+                  <a:pt x="4439624" y="5948433"/>
+                  <a:pt x="4559494" y="6007718"/>
+                  <a:pt x="4688552" y="6049453"/>
+                </a:cubicBezTo>
+                <a:cubicBezTo>
+                  <a:pt x="4993968" y="6148131"/>
+                  <a:pt x="5305360" y="6227308"/>
+                  <a:pt x="5634660" y="6238620"/>
+                </a:cubicBezTo>
+                <a:cubicBezTo>
+                  <a:pt x="5906549" y="6247590"/>
+                  <a:pt x="8264931" y="6239010"/>
+                  <a:pt x="9222980" y="4955397"/>
+                </a:cubicBezTo>
+                <a:cubicBezTo>
+                  <a:pt x="9241350" y="4949155"/>
+                  <a:pt x="9262017" y="4932775"/>
+                  <a:pt x="9268448" y="4917173"/>
+                </a:cubicBezTo>
+                <a:cubicBezTo>
+                  <a:pt x="9299220" y="4844235"/>
+                  <a:pt x="9374540" y="4812644"/>
+                  <a:pt x="9442512" y="4773251"/>
+                </a:cubicBezTo>
+                <a:cubicBezTo>
+                  <a:pt x="9502220" y="4738536"/>
+                  <a:pt x="9565600" y="4702263"/>
+                  <a:pt x="9590400" y="4643756"/>
+                </a:cubicBezTo>
+                <a:cubicBezTo>
+                  <a:pt x="9623008" y="4565749"/>
+                  <a:pt x="9530236" y="4629716"/>
+                  <a:pt x="9513242" y="4600073"/>
+                </a:cubicBezTo>
+                <a:cubicBezTo>
+                  <a:pt x="9548605" y="4559509"/>
+                  <a:pt x="9603261" y="4522454"/>
+                  <a:pt x="9617498" y="4476430"/>
+                </a:cubicBezTo>
+                <a:cubicBezTo>
+                  <a:pt x="9669394" y="4310276"/>
+                  <a:pt x="9781460" y="4189364"/>
+                  <a:pt x="9949094" y="4095364"/>
+                </a:cubicBezTo>
+                <a:cubicBezTo>
+                  <a:pt x="9997318" y="4068452"/>
+                  <a:pt x="10029007" y="4019306"/>
+                  <a:pt x="10094686" y="4011507"/>
+                </a:cubicBezTo>
+                <a:cubicBezTo>
+                  <a:pt x="10240735" y="3994345"/>
+                  <a:pt x="10194808" y="3860171"/>
+                  <a:pt x="10271967" y="3800497"/>
+                </a:cubicBezTo>
+                <a:cubicBezTo>
+                  <a:pt x="10286662" y="3789184"/>
+                  <a:pt x="10299980" y="3766953"/>
+                  <a:pt x="10297226" y="3751742"/>
+                </a:cubicBezTo>
+                <a:cubicBezTo>
+                  <a:pt x="10293091" y="3729898"/>
+                  <a:pt x="10275639" y="3709227"/>
+                  <a:pt x="10260943" y="3689723"/>
+                </a:cubicBezTo>
+                <a:cubicBezTo>
+                  <a:pt x="10245786" y="3670222"/>
+                  <a:pt x="10222825" y="3653061"/>
+                  <a:pt x="10233847" y="3627319"/>
+                </a:cubicBezTo>
+                <a:cubicBezTo>
+                  <a:pt x="10238437" y="3616788"/>
+                  <a:pt x="10235225" y="3580125"/>
+                  <a:pt x="10269209" y="3608986"/>
+                </a:cubicBezTo>
+                <a:cubicBezTo>
+                  <a:pt x="10362443" y="3688165"/>
+                  <a:pt x="10416637" y="3613279"/>
+                  <a:pt x="10496550" y="3577393"/>
+                </a:cubicBezTo>
+                <a:cubicBezTo>
+                  <a:pt x="10432253" y="3540340"/>
+                  <a:pt x="10374383" y="3514208"/>
+                  <a:pt x="10364738" y="3458823"/>
+                </a:cubicBezTo>
+                <a:cubicBezTo>
+                  <a:pt x="10344991" y="3344542"/>
+                  <a:pt x="10260485" y="3292277"/>
+                  <a:pt x="10132346" y="3282137"/>
+                </a:cubicBezTo>
+                <a:cubicBezTo>
+                  <a:pt x="10179650" y="3171757"/>
+                  <a:pt x="10179650" y="3171757"/>
+                  <a:pt x="10026712" y="3156543"/>
+                </a:cubicBezTo>
+                <a:cubicBezTo>
+                  <a:pt x="10085499" y="3086337"/>
+                  <a:pt x="10085499" y="3068396"/>
+                  <a:pt x="10014312" y="3044213"/>
+                </a:cubicBezTo>
+                <a:cubicBezTo>
+                  <a:pt x="9945880" y="3021201"/>
+                  <a:pt x="9870100" y="3013401"/>
+                  <a:pt x="9806718" y="2977907"/>
+                </a:cubicBezTo>
+                <a:cubicBezTo>
+                  <a:pt x="9865047" y="2888199"/>
+                  <a:pt x="9881580" y="2784060"/>
+                  <a:pt x="10001912" y="2740374"/>
+                </a:cubicBezTo>
+                <a:cubicBezTo>
+                  <a:pt x="10020741" y="2733743"/>
+                  <a:pt x="10033600" y="2706830"/>
+                  <a:pt x="10021662" y="2691231"/>
+                </a:cubicBezTo>
+                <a:cubicBezTo>
+                  <a:pt x="9978030" y="2634675"/>
+                  <a:pt x="10040492" y="2527414"/>
+                  <a:pt x="9904546" y="2515322"/>
+                </a:cubicBezTo>
+                <a:cubicBezTo>
+                  <a:pt x="9887552" y="2514152"/>
+                  <a:pt x="9871936" y="2502450"/>
+                  <a:pt x="9885256" y="2487240"/>
+                </a:cubicBezTo>
+                <a:cubicBezTo>
+                  <a:pt x="9931184" y="2434196"/>
+                  <a:pt x="9875611" y="2437706"/>
+                  <a:pt x="9842085" y="2431074"/>
+                </a:cubicBezTo>
+                <a:cubicBezTo>
+                  <a:pt x="9801668" y="2422884"/>
+                  <a:pt x="9755740" y="2446287"/>
+                  <a:pt x="9718078" y="2417424"/>
+                </a:cubicBezTo>
+                <a:cubicBezTo>
+                  <a:pt x="9726806" y="2386999"/>
+                  <a:pt x="9759413" y="2387390"/>
+                  <a:pt x="9782378" y="2377641"/>
+                </a:cubicBezTo>
+                <a:cubicBezTo>
+                  <a:pt x="9849430" y="2349558"/>
+                  <a:pt x="9904086" y="2316013"/>
+                  <a:pt x="9907302" y="2243078"/>
+                </a:cubicBezTo>
+                <a:cubicBezTo>
+                  <a:pt x="9909596" y="2184182"/>
+                  <a:pt x="9916946" y="2132305"/>
+                  <a:pt x="9824171" y="2114365"/>
+                </a:cubicBezTo>
+                <a:cubicBezTo>
+                  <a:pt x="9785593" y="2106953"/>
+                  <a:pt x="9796616" y="2064440"/>
+                  <a:pt x="9818662" y="2043377"/>
+                </a:cubicBezTo>
+                <a:cubicBezTo>
+                  <a:pt x="9858160" y="2005933"/>
+                  <a:pt x="9890766" y="1956008"/>
+                  <a:pt x="9958740" y="1952499"/>
+                </a:cubicBezTo>
+                <a:cubicBezTo>
+                  <a:pt x="10000075" y="1950158"/>
+                  <a:pt x="10031764" y="1934556"/>
+                  <a:pt x="10064374" y="1916615"/>
+                </a:cubicBezTo>
+                <a:cubicBezTo>
+                  <a:pt x="10087795" y="1903743"/>
+                  <a:pt x="10115810" y="1892823"/>
+                  <a:pt x="10113055" y="1865131"/>
+                </a:cubicBezTo>
+                <a:cubicBezTo>
+                  <a:pt x="10110302" y="1838607"/>
+                  <a:pt x="10083203" y="1827686"/>
+                  <a:pt x="10055646" y="1822227"/>
+                </a:cubicBezTo>
+                <a:cubicBezTo>
+                  <a:pt x="9963792" y="1804675"/>
+                  <a:pt x="9877448" y="1778933"/>
+                  <a:pt x="9800748" y="1720036"/>
+                </a:cubicBezTo>
+                <a:cubicBezTo>
+                  <a:pt x="9851726" y="1688834"/>
+                  <a:pt x="9900410" y="1666211"/>
+                  <a:pt x="9938071" y="1634617"/>
+                </a:cubicBezTo>
+                <a:cubicBezTo>
+                  <a:pt x="10029007" y="1558172"/>
+                  <a:pt x="9258802" y="1317517"/>
+                  <a:pt x="9220224" y="1231709"/>
+                </a:cubicBezTo>
+                <a:cubicBezTo>
+                  <a:pt x="9208284" y="1205187"/>
+                  <a:pt x="9167410" y="1177883"/>
+                  <a:pt x="9133419" y="1170083"/>
+                </a:cubicBezTo>
+                <a:cubicBezTo>
+                  <a:pt x="8974052" y="1133420"/>
+                  <a:pt x="8835810" y="1051123"/>
+                  <a:pt x="8672768" y="1020699"/>
+                </a:cubicBezTo>
+                <a:cubicBezTo>
+                  <a:pt x="8518912" y="991837"/>
+                  <a:pt x="8367350" y="953222"/>
+                  <a:pt x="8198797" y="915000"/>
+                </a:cubicBezTo>
+                <a:cubicBezTo>
+                  <a:pt x="8302134" y="819048"/>
+                  <a:pt x="8485382" y="830361"/>
+                  <a:pt x="8528095" y="691898"/>
+                </a:cubicBezTo>
+                <a:cubicBezTo>
+                  <a:pt x="8361379" y="656013"/>
+                  <a:pt x="8185937" y="696968"/>
+                  <a:pt x="8025190" y="640021"/>
+                </a:cubicBezTo>
+                <a:cubicBezTo>
+                  <a:pt x="8011411" y="634954"/>
+                  <a:pt x="7992579" y="640021"/>
+                  <a:pt x="7976047" y="641584"/>
+                </a:cubicBezTo>
+                <a:cubicBezTo>
+                  <a:pt x="7644909" y="672005"/>
+                  <a:pt x="7315149" y="645484"/>
+                  <a:pt x="6988604" y="607260"/>
+                </a:cubicBezTo>
+                <a:cubicBezTo>
+                  <a:pt x="6518305" y="552656"/>
+                  <a:pt x="6046170" y="517941"/>
+                  <a:pt x="5573116" y="493368"/>
+                </a:cubicBezTo>
+                <a:cubicBezTo>
+                  <a:pt x="5182272" y="473086"/>
+                  <a:pt x="4790511" y="464116"/>
+                  <a:pt x="4401503" y="425112"/>
+                </a:cubicBezTo>
+                <a:cubicBezTo>
+                  <a:pt x="3985401" y="383379"/>
+                  <a:pt x="3569756" y="336184"/>
+                  <a:pt x="3154109" y="292499"/>
+                </a:cubicBezTo>
+                <a:cubicBezTo>
+                  <a:pt x="3135280" y="290549"/>
+                  <a:pt x="3114499" y="284406"/>
+                  <a:pt x="3094406" y="283966"/>
+                </a:cubicBezTo>
+                <a:close/>
+                <a:moveTo>
+                  <a:pt x="0" y="0"/>
+                </a:moveTo>
+                <a:lnTo>
+                  <a:pt x="12192000" y="0"/>
+                </a:lnTo>
+                <a:lnTo>
+                  <a:pt x="12192000" y="6858000"/>
+                </a:lnTo>
+                <a:lnTo>
+                  <a:pt x="0" y="6858000"/>
+                </a:lnTo>
+                <a:close/>
+              </a:path>
+            </a:pathLst>
+          </a:custGeom>
+          <a:solidFill>
+            <a:schemeClr val="bg2">
+              <a:alpha val="50000"/>
+            </a:schemeClr>
+          </a:solidFill>
+          <a:ln w="32707" cap="flat">
+            <a:noFill/>
+            <a:prstDash val="solid"/>
+            <a:miter/>
+          </a:ln>
+        </p:spPr>
+        <p:txBody>
+          <a:bodyPr wrap="square" rtlCol="0" anchor="ctr">
+            <a:noAutofit/>
+          </a:bodyPr>
+          <a:lstStyle/>
+          <a:p>
+            <a:pPr algn="ctr"/>
+            <a:endParaRPr lang="en-US"/>
+          </a:p>
+        </p:txBody>
+      </p:sp>
+      <p:pic>
+        <p:nvPicPr>
+          <p:cNvPr id="3" name="グラフィックス 2" descr="ヒーロー (男性) 単色塗りつぶし">
+            <a:extLst>
+              <a:ext uri="{FF2B5EF4-FFF2-40B4-BE49-F238E27FC236}">
+                <a16:creationId xmlns:a16="http://schemas.microsoft.com/office/drawing/2014/main" id="{FF5A8818-5DFC-4548-A70D-346A62DCE135}"/>
+              </a:ext>
+            </a:extLst>
+          </p:cNvPr>
+          <p:cNvPicPr>
+            <a:picLocks noChangeAspect="1"/>
+          </p:cNvPicPr>
+          <p:nvPr/>
+        </p:nvPicPr>
+        <p:blipFill>
+          <a:blip r:embed="rId2">
+            <a:extLst>
+              <a:ext uri="{28A0092B-C50C-407E-A947-70E740481C1C}">
+                <a14:useLocalDpi xmlns:a14="http://schemas.microsoft.com/office/drawing/2010/main" val="0"/>
+              </a:ext>
+              <a:ext uri="{96DAC541-7B7A-43D3-8B79-37D633B846F1}">
+                <asvg:svgBlip xmlns:asvg="http://schemas.microsoft.com/office/drawing/2016/SVG/main" r:embed="rId3"/>
+              </a:ext>
+            </a:extLst>
+          </a:blip>
+          <a:stretch>
+            <a:fillRect/>
+          </a:stretch>
+        </p:blipFill>
+        <p:spPr>
+          <a:xfrm>
+            <a:off x="4172233" y="1201003"/>
+            <a:ext cx="4107976" cy="4107976"/>
+          </a:xfrm>
+          <a:prstGeom prst="rect">
+            <a:avLst/>
+          </a:prstGeom>
+        </p:spPr>
+      </p:pic>
+    </p:spTree>
+    <p:extLst>
+      <p:ext uri="{BB962C8B-B14F-4D97-AF65-F5344CB8AC3E}">
+        <p14:creationId xmlns:p14="http://schemas.microsoft.com/office/powerpoint/2010/main" val="1097503835"/>
+      </p:ext>
+    </p:extLst>
+  </p:cSld>
+  <p:clrMapOvr>
+    <a:masterClrMapping/>
+  </p:clrMapOvr>
+</p:sld>
+</file>
+
+<file path=ppt/slides/slide11.xml><?xml version="1.0" encoding="utf-8"?>
+<p:sld xmlns:a="http://schemas.openxmlformats.org/drawingml/2006/main" xmlns:r="http://schemas.openxmlformats.org/officeDocument/2006/relationships" xmlns:p="http://schemas.openxmlformats.org/presentationml/2006/main">
+  <p:cSld>
+    <p:spTree>
+      <p:nvGrpSpPr>
+        <p:cNvPr id="1" name=""/>
+        <p:cNvGrpSpPr/>
+        <p:nvPr/>
+      </p:nvGrpSpPr>
+      <p:grpSpPr>
+        <a:xfrm>
+          <a:off x="0" y="0"/>
+          <a:ext cx="0" cy="0"/>
+          <a:chOff x="0" y="0"/>
+          <a:chExt cx="0" cy="0"/>
+        </a:xfrm>
+      </p:grpSpPr>
+      <p:pic>
+        <p:nvPicPr>
+          <p:cNvPr id="3" name="グラフィックス 2" descr="ドングリ 単色塗りつぶし">
+            <a:extLst>
+              <a:ext uri="{FF2B5EF4-FFF2-40B4-BE49-F238E27FC236}">
+                <a16:creationId xmlns:a16="http://schemas.microsoft.com/office/drawing/2014/main" id="{C8DF4D43-EB0F-49DF-AD13-275A8DB11235}"/>
+              </a:ext>
+            </a:extLst>
+          </p:cNvPr>
+          <p:cNvPicPr>
+            <a:picLocks noChangeAspect="1"/>
+          </p:cNvPicPr>
+          <p:nvPr/>
+        </p:nvPicPr>
+        <p:blipFill>
+          <a:blip r:embed="rId2">
+            <a:extLst>
+              <a:ext uri="{28A0092B-C50C-407E-A947-70E740481C1C}">
+                <a14:useLocalDpi xmlns:a14="http://schemas.microsoft.com/office/drawing/2010/main" val="0"/>
+              </a:ext>
+              <a:ext uri="{96DAC541-7B7A-43D3-8B79-37D633B846F1}">
+                <asvg:svgBlip xmlns:asvg="http://schemas.microsoft.com/office/drawing/2016/SVG/main" r:embed="rId3"/>
+              </a:ext>
+            </a:extLst>
+          </a:blip>
+          <a:stretch>
+            <a:fillRect/>
+          </a:stretch>
+        </p:blipFill>
+        <p:spPr>
+          <a:xfrm>
+            <a:off x="3163452" y="858982"/>
+            <a:ext cx="4983019" cy="4983019"/>
+          </a:xfrm>
+          <a:prstGeom prst="rect">
+            <a:avLst/>
+          </a:prstGeom>
+        </p:spPr>
+      </p:pic>
+    </p:spTree>
+    <p:extLst>
+      <p:ext uri="{BB962C8B-B14F-4D97-AF65-F5344CB8AC3E}">
+        <p14:creationId xmlns:p14="http://schemas.microsoft.com/office/powerpoint/2010/main" val="1255191397"/>
       </p:ext>
     </p:extLst>
   </p:cSld>

</xml_diff>